<commit_message>
Updated part I and figures
</commit_message>
<xml_diff>
--- a/Part_I/Report/Figures/Water_Distribution/Nozzle_Position_Legends.pptx
+++ b/Part_I/Report/Figures/Water_Distribution/Nozzle_Position_Legends.pptx
@@ -245,7 +245,7 @@
           <a:p>
             <a:fld id="{7016570D-1111-4BA0-A83B-25D28BD4B25A}" type="datetimeFigureOut">
               <a:rPr lang="en-US" smtClean="0"/>
-              <a:t>7/19/2016</a:t>
+              <a:t>1/4/2017</a:t>
             </a:fld>
             <a:endParaRPr lang="en-US"/>
           </a:p>
@@ -415,7 +415,7 @@
           <a:p>
             <a:fld id="{7016570D-1111-4BA0-A83B-25D28BD4B25A}" type="datetimeFigureOut">
               <a:rPr lang="en-US" smtClean="0"/>
-              <a:t>7/19/2016</a:t>
+              <a:t>1/4/2017</a:t>
             </a:fld>
             <a:endParaRPr lang="en-US"/>
           </a:p>
@@ -595,7 +595,7 @@
           <a:p>
             <a:fld id="{7016570D-1111-4BA0-A83B-25D28BD4B25A}" type="datetimeFigureOut">
               <a:rPr lang="en-US" smtClean="0"/>
-              <a:t>7/19/2016</a:t>
+              <a:t>1/4/2017</a:t>
             </a:fld>
             <a:endParaRPr lang="en-US"/>
           </a:p>
@@ -765,7 +765,7 @@
           <a:p>
             <a:fld id="{7016570D-1111-4BA0-A83B-25D28BD4B25A}" type="datetimeFigureOut">
               <a:rPr lang="en-US" smtClean="0"/>
-              <a:t>7/19/2016</a:t>
+              <a:t>1/4/2017</a:t>
             </a:fld>
             <a:endParaRPr lang="en-US"/>
           </a:p>
@@ -1011,7 +1011,7 @@
           <a:p>
             <a:fld id="{7016570D-1111-4BA0-A83B-25D28BD4B25A}" type="datetimeFigureOut">
               <a:rPr lang="en-US" smtClean="0"/>
-              <a:t>7/19/2016</a:t>
+              <a:t>1/4/2017</a:t>
             </a:fld>
             <a:endParaRPr lang="en-US"/>
           </a:p>
@@ -1243,7 +1243,7 @@
           <a:p>
             <a:fld id="{7016570D-1111-4BA0-A83B-25D28BD4B25A}" type="datetimeFigureOut">
               <a:rPr lang="en-US" smtClean="0"/>
-              <a:t>7/19/2016</a:t>
+              <a:t>1/4/2017</a:t>
             </a:fld>
             <a:endParaRPr lang="en-US"/>
           </a:p>
@@ -1610,7 +1610,7 @@
           <a:p>
             <a:fld id="{7016570D-1111-4BA0-A83B-25D28BD4B25A}" type="datetimeFigureOut">
               <a:rPr lang="en-US" smtClean="0"/>
-              <a:t>7/19/2016</a:t>
+              <a:t>1/4/2017</a:t>
             </a:fld>
             <a:endParaRPr lang="en-US"/>
           </a:p>
@@ -1728,7 +1728,7 @@
           <a:p>
             <a:fld id="{7016570D-1111-4BA0-A83B-25D28BD4B25A}" type="datetimeFigureOut">
               <a:rPr lang="en-US" smtClean="0"/>
-              <a:t>7/19/2016</a:t>
+              <a:t>1/4/2017</a:t>
             </a:fld>
             <a:endParaRPr lang="en-US"/>
           </a:p>
@@ -1823,7 +1823,7 @@
           <a:p>
             <a:fld id="{7016570D-1111-4BA0-A83B-25D28BD4B25A}" type="datetimeFigureOut">
               <a:rPr lang="en-US" smtClean="0"/>
-              <a:t>7/19/2016</a:t>
+              <a:t>1/4/2017</a:t>
             </a:fld>
             <a:endParaRPr lang="en-US"/>
           </a:p>
@@ -2100,7 +2100,7 @@
           <a:p>
             <a:fld id="{7016570D-1111-4BA0-A83B-25D28BD4B25A}" type="datetimeFigureOut">
               <a:rPr lang="en-US" smtClean="0"/>
-              <a:t>7/19/2016</a:t>
+              <a:t>1/4/2017</a:t>
             </a:fld>
             <a:endParaRPr lang="en-US"/>
           </a:p>
@@ -2353,7 +2353,7 @@
           <a:p>
             <a:fld id="{7016570D-1111-4BA0-A83B-25D28BD4B25A}" type="datetimeFigureOut">
               <a:rPr lang="en-US" smtClean="0"/>
-              <a:t>7/19/2016</a:t>
+              <a:t>1/4/2017</a:t>
             </a:fld>
             <a:endParaRPr lang="en-US"/>
           </a:p>
@@ -2566,7 +2566,7 @@
           <a:p>
             <a:fld id="{7016570D-1111-4BA0-A83B-25D28BD4B25A}" type="datetimeFigureOut">
               <a:rPr lang="en-US" smtClean="0"/>
-              <a:t>7/19/2016</a:t>
+              <a:t>1/4/2017</a:t>
             </a:fld>
             <a:endParaRPr lang="en-US"/>
           </a:p>
@@ -3239,9 +3239,9 @@
           <p:grpSpPr>
             <a:xfrm>
               <a:off x="5294049" y="488272"/>
-              <a:ext cx="1781454" cy="798990"/>
+              <a:ext cx="1781454" cy="860614"/>
               <a:chOff x="5294049" y="488272"/>
-              <a:chExt cx="1781454" cy="798990"/>
+              <a:chExt cx="1781454" cy="860614"/>
             </a:xfrm>
           </p:grpSpPr>
           <p:sp>
@@ -3397,7 +3397,7 @@
             <p:spPr>
               <a:xfrm>
                 <a:off x="6516183" y="916165"/>
-                <a:ext cx="361077" cy="369332"/>
+                <a:ext cx="361077" cy="432721"/>
               </a:xfrm>
               <a:prstGeom prst="rect">
                 <a:avLst/>
@@ -3415,7 +3415,7 @@
                   <a:rPr lang="en-US" b="1" cap="none" spc="0" dirty="0" smtClean="0">
                     <a:ln w="0"/>
                     <a:solidFill>
-                      <a:schemeClr val="tx1"/>
+                      <a:schemeClr val="bg1"/>
                     </a:solidFill>
                     <a:effectLst>
                       <a:outerShdw blurRad="38100" dist="19050" dir="2700000" algn="tl" rotWithShape="0">
@@ -3430,7 +3430,7 @@
                 <a:endParaRPr lang="en-US" sz="5400" b="1" cap="none" spc="0" dirty="0">
                   <a:ln w="0"/>
                   <a:solidFill>
-                    <a:schemeClr val="tx1"/>
+                    <a:schemeClr val="bg1"/>
                   </a:solidFill>
                   <a:effectLst>
                     <a:outerShdw blurRad="38100" dist="19050" dir="2700000" algn="tl" rotWithShape="0">
@@ -3451,8 +3451,8 @@
             </p:nvSpPr>
             <p:spPr>
               <a:xfrm>
-                <a:off x="5976124" y="713456"/>
-                <a:ext cx="361077" cy="369332"/>
+                <a:off x="5976123" y="713456"/>
+                <a:ext cx="361077" cy="432721"/>
               </a:xfrm>
               <a:prstGeom prst="rect">
                 <a:avLst/>
@@ -3470,7 +3470,7 @@
                   <a:rPr lang="en-US" b="1" cap="none" spc="0" dirty="0" smtClean="0">
                     <a:ln w="0"/>
                     <a:solidFill>
-                      <a:schemeClr val="tx1"/>
+                      <a:schemeClr val="bg1"/>
                     </a:solidFill>
                     <a:effectLst>
                       <a:outerShdw blurRad="38100" dist="19050" dir="2700000" algn="tl" rotWithShape="0">
@@ -3485,7 +3485,7 @@
                 <a:endParaRPr lang="en-US" sz="5400" b="1" cap="none" spc="0" dirty="0">
                   <a:ln w="0"/>
                   <a:solidFill>
-                    <a:schemeClr val="tx1"/>
+                    <a:schemeClr val="bg1"/>
                   </a:solidFill>
                   <a:effectLst>
                     <a:outerShdw blurRad="38100" dist="19050" dir="2700000" algn="tl" rotWithShape="0">
@@ -3506,8 +3506,8 @@
             </p:nvSpPr>
             <p:spPr>
               <a:xfrm>
-                <a:off x="5443463" y="500392"/>
-                <a:ext cx="361077" cy="369332"/>
+                <a:off x="5443463" y="500393"/>
+                <a:ext cx="361077" cy="432721"/>
               </a:xfrm>
               <a:prstGeom prst="rect">
                 <a:avLst/>
@@ -3524,6 +3524,9 @@
                 <a:r>
                   <a:rPr lang="en-US" b="1" dirty="0">
                     <a:ln w="0"/>
+                    <a:solidFill>
+                      <a:schemeClr val="bg1"/>
+                    </a:solidFill>
                     <a:effectLst>
                       <a:outerShdw blurRad="38100" dist="19050" dir="2700000" algn="tl" rotWithShape="0">
                         <a:schemeClr val="dk1">
@@ -3537,7 +3540,7 @@
                 <a:endParaRPr lang="en-US" sz="5400" b="1" cap="none" spc="0" dirty="0">
                   <a:ln w="0"/>
                   <a:solidFill>
-                    <a:schemeClr val="tx1"/>
+                    <a:schemeClr val="bg1"/>
                   </a:solidFill>
                   <a:effectLst>
                     <a:outerShdw blurRad="38100" dist="19050" dir="2700000" algn="tl" rotWithShape="0">
@@ -3600,7 +3603,7 @@
         <p:spPr>
           <a:xfrm>
             <a:off x="7084756" y="4274024"/>
-            <a:ext cx="2681057" cy="1200329"/>
+            <a:ext cx="2681057" cy="1477328"/>
           </a:xfrm>
           <a:prstGeom prst="rect">
             <a:avLst/>
@@ -3615,35 +3618,33 @@
           <a:p>
             <a:r>
               <a:rPr lang="en-US" dirty="0" smtClean="0"/>
-              <a:t>1: </a:t>
+              <a:t>1: Max </a:t>
             </a:r>
             <a:r>
               <a:rPr lang="en-US" dirty="0" smtClean="0"/>
-              <a:t>Max Angle</a:t>
+              <a:t>Angle Ceiling</a:t>
             </a:r>
             <a:endParaRPr lang="en-US" dirty="0" smtClean="0"/>
           </a:p>
           <a:p>
             <a:r>
               <a:rPr lang="en-US" dirty="0" smtClean="0"/>
-              <a:t>2: </a:t>
-            </a:r>
+              <a:t>2: Mid Ceiling</a:t>
+            </a:r>
+          </a:p>
+          <a:p>
             <a:r>
               <a:rPr lang="en-US" dirty="0" smtClean="0"/>
-              <a:t>Mid Ceiling</a:t>
-            </a:r>
-            <a:endParaRPr lang="en-US" dirty="0" smtClean="0"/>
-          </a:p>
-          <a:p>
+              <a:t>3: Min </a:t>
+            </a:r>
             <a:r>
               <a:rPr lang="en-US" dirty="0" smtClean="0"/>
-              <a:t>3: </a:t>
+              <a:t>Angle </a:t>
             </a:r>
             <a:r>
               <a:rPr lang="en-US" dirty="0" smtClean="0"/>
-              <a:t>Min Angle: Ceiling</a:t>
-            </a:r>
-            <a:endParaRPr lang="en-US" dirty="0" smtClean="0"/>
+              <a:t>Ceiling</a:t>
+            </a:r>
           </a:p>
           <a:p>
             <a:r>
@@ -3652,7 +3653,17 @@
             </a:r>
             <a:r>
               <a:rPr lang="en-US" dirty="0" smtClean="0"/>
-              <a:t>Min Angle: Wall</a:t>
+              <a:t>Max Angle </a:t>
+            </a:r>
+            <a:r>
+              <a:rPr lang="en-US" dirty="0" smtClean="0"/>
+              <a:t>Wall</a:t>
+            </a:r>
+          </a:p>
+          <a:p>
+            <a:r>
+              <a:rPr lang="en-US" dirty="0" smtClean="0"/>
+              <a:t>5: At Wall</a:t>
             </a:r>
             <a:endParaRPr lang="en-US" dirty="0"/>
           </a:p>
@@ -3843,7 +3854,7 @@
               <a:rPr lang="en-US" sz="2000" b="1" cap="none" spc="0" dirty="0" smtClean="0">
                 <a:ln w="0"/>
                 <a:solidFill>
-                  <a:schemeClr val="tx1"/>
+                  <a:schemeClr val="bg1"/>
                 </a:solidFill>
                 <a:effectLst>
                   <a:outerShdw blurRad="38100" dist="19050" dir="2700000" algn="tl" rotWithShape="0">
@@ -3858,7 +3869,181 @@
             <a:endParaRPr lang="en-US" sz="5400" b="1" cap="none" spc="0" dirty="0">
               <a:ln w="0"/>
               <a:solidFill>
-                <a:schemeClr val="tx1"/>
+                <a:schemeClr val="bg1"/>
+              </a:solidFill>
+              <a:effectLst>
+                <a:outerShdw blurRad="38100" dist="19050" dir="2700000" algn="tl" rotWithShape="0">
+                  <a:schemeClr val="dk1">
+                    <a:alpha val="40000"/>
+                  </a:schemeClr>
+                </a:outerShdw>
+              </a:effectLst>
+            </a:endParaRPr>
+          </a:p>
+        </p:txBody>
+      </p:sp>
+      <p:cxnSp>
+        <p:nvCxnSpPr>
+          <p:cNvPr id="3" name="Straight Connector 2"/>
+          <p:cNvCxnSpPr/>
+          <p:nvPr/>
+        </p:nvCxnSpPr>
+        <p:spPr>
+          <a:xfrm flipH="1" flipV="1">
+            <a:off x="9195830" y="1494059"/>
+            <a:ext cx="390201" cy="333396"/>
+          </a:xfrm>
+          <a:prstGeom prst="line">
+            <a:avLst/>
+          </a:prstGeom>
+          <a:ln w="38100">
+            <a:solidFill>
+              <a:srgbClr val="112CF7"/>
+            </a:solidFill>
+          </a:ln>
+        </p:spPr>
+        <p:style>
+          <a:lnRef idx="3">
+            <a:schemeClr val="accent5"/>
+          </a:lnRef>
+          <a:fillRef idx="0">
+            <a:schemeClr val="accent5"/>
+          </a:fillRef>
+          <a:effectRef idx="2">
+            <a:schemeClr val="accent5"/>
+          </a:effectRef>
+          <a:fontRef idx="minor">
+            <a:schemeClr val="tx1"/>
+          </a:fontRef>
+        </p:style>
+      </p:cxnSp>
+      <p:cxnSp>
+        <p:nvCxnSpPr>
+          <p:cNvPr id="6" name="Straight Arrow Connector 5"/>
+          <p:cNvCxnSpPr/>
+          <p:nvPr/>
+        </p:nvCxnSpPr>
+        <p:spPr>
+          <a:xfrm flipH="1" flipV="1">
+            <a:off x="8757524" y="1233357"/>
+            <a:ext cx="394444" cy="242231"/>
+          </a:xfrm>
+          <a:prstGeom prst="straightConnector1">
+            <a:avLst/>
+          </a:prstGeom>
+          <a:ln w="38100">
+            <a:solidFill>
+              <a:srgbClr val="112CF7"/>
+            </a:solidFill>
+            <a:prstDash val="dash"/>
+            <a:tailEnd type="triangle"/>
+          </a:ln>
+        </p:spPr>
+        <p:style>
+          <a:lnRef idx="1">
+            <a:schemeClr val="accent1"/>
+          </a:lnRef>
+          <a:fillRef idx="0">
+            <a:schemeClr val="accent1"/>
+          </a:fillRef>
+          <a:effectRef idx="0">
+            <a:schemeClr val="accent1"/>
+          </a:effectRef>
+          <a:fontRef idx="minor">
+            <a:schemeClr val="tx1"/>
+          </a:fontRef>
+        </p:style>
+      </p:cxnSp>
+      <p:sp>
+        <p:nvSpPr>
+          <p:cNvPr id="30" name="Explosion 2 29"/>
+          <p:cNvSpPr/>
+          <p:nvPr/>
+        </p:nvSpPr>
+        <p:spPr>
+          <a:xfrm>
+            <a:off x="8359100" y="932248"/>
+            <a:ext cx="462240" cy="381620"/>
+          </a:xfrm>
+          <a:prstGeom prst="irregularSeal2">
+            <a:avLst/>
+          </a:prstGeom>
+          <a:solidFill>
+            <a:srgbClr val="112CF7"/>
+          </a:solidFill>
+          <a:ln>
+            <a:solidFill>
+              <a:srgbClr val="112CF7"/>
+            </a:solidFill>
+          </a:ln>
+        </p:spPr>
+        <p:style>
+          <a:lnRef idx="2">
+            <a:schemeClr val="accent1">
+              <a:shade val="50000"/>
+            </a:schemeClr>
+          </a:lnRef>
+          <a:fillRef idx="1">
+            <a:schemeClr val="accent1"/>
+          </a:fillRef>
+          <a:effectRef idx="0">
+            <a:schemeClr val="accent1"/>
+          </a:effectRef>
+          <a:fontRef idx="minor">
+            <a:schemeClr val="lt1"/>
+          </a:fontRef>
+        </p:style>
+        <p:txBody>
+          <a:bodyPr rtlCol="0" anchor="ctr"/>
+          <a:lstStyle/>
+          <a:p>
+            <a:pPr algn="ctr"/>
+            <a:endParaRPr lang="en-US"/>
+          </a:p>
+        </p:txBody>
+      </p:sp>
+      <p:sp>
+        <p:nvSpPr>
+          <p:cNvPr id="8" name="Rectangle 7"/>
+          <p:cNvSpPr/>
+          <p:nvPr/>
+        </p:nvSpPr>
+        <p:spPr>
+          <a:xfrm>
+            <a:off x="8430529" y="938392"/>
+            <a:ext cx="301686" cy="369332"/>
+          </a:xfrm>
+          <a:prstGeom prst="rect">
+            <a:avLst/>
+          </a:prstGeom>
+        </p:spPr>
+        <p:txBody>
+          <a:bodyPr wrap="none">
+            <a:spAutoFit/>
+          </a:bodyPr>
+          <a:lstStyle/>
+          <a:p>
+            <a:pPr algn="ctr"/>
+            <a:r>
+              <a:rPr lang="en-US" b="1" dirty="0">
+                <a:ln w="0"/>
+                <a:solidFill>
+                  <a:schemeClr val="bg1"/>
+                </a:solidFill>
+                <a:effectLst>
+                  <a:outerShdw blurRad="38100" dist="19050" dir="2700000" algn="tl" rotWithShape="0">
+                    <a:schemeClr val="dk1">
+                      <a:alpha val="40000"/>
+                    </a:schemeClr>
+                  </a:outerShdw>
+                </a:effectLst>
+              </a:rPr>
+              <a:t>5</a:t>
+            </a:r>
+            <a:endParaRPr lang="en-US" sz="4800" b="1" dirty="0">
+              <a:ln w="0"/>
+              <a:solidFill>
+                <a:schemeClr val="bg1"/>
               </a:solidFill>
               <a:effectLst>
                 <a:outerShdw blurRad="38100" dist="19050" dir="2700000" algn="tl" rotWithShape="0">
@@ -3952,10 +4137,10 @@
           </p:nvGrpSpPr>
           <p:grpSpPr>
             <a:xfrm rot="21339639">
-              <a:off x="6519172" y="488276"/>
-              <a:ext cx="1781454" cy="798990"/>
-              <a:chOff x="5294049" y="488272"/>
-              <a:chExt cx="1781454" cy="798990"/>
+              <a:off x="6519564" y="482530"/>
+              <a:ext cx="1781454" cy="820808"/>
+              <a:chOff x="5294049" y="482541"/>
+              <a:chExt cx="1781454" cy="820808"/>
             </a:xfrm>
           </p:grpSpPr>
           <p:sp>
@@ -4110,8 +4295,8 @@
             </p:nvSpPr>
             <p:spPr>
               <a:xfrm>
-                <a:off x="6516183" y="916165"/>
-                <a:ext cx="361077" cy="369332"/>
+                <a:off x="6516183" y="898315"/>
+                <a:ext cx="361077" cy="405034"/>
               </a:xfrm>
               <a:prstGeom prst="rect">
                 <a:avLst/>
@@ -4129,7 +4314,7 @@
                   <a:rPr lang="en-US" b="1" cap="none" spc="0" dirty="0" smtClean="0">
                     <a:ln w="0"/>
                     <a:solidFill>
-                      <a:schemeClr val="tx1"/>
+                      <a:schemeClr val="bg1"/>
                     </a:solidFill>
                     <a:effectLst>
                       <a:outerShdw blurRad="38100" dist="19050" dir="2700000" algn="tl" rotWithShape="0">
@@ -4144,7 +4329,7 @@
                 <a:endParaRPr lang="en-US" sz="5400" b="1" cap="none" spc="0" dirty="0">
                   <a:ln w="0"/>
                   <a:solidFill>
-                    <a:schemeClr val="tx1"/>
+                    <a:schemeClr val="bg1"/>
                   </a:solidFill>
                   <a:effectLst>
                     <a:outerShdw blurRad="38100" dist="19050" dir="2700000" algn="tl" rotWithShape="0">
@@ -4165,8 +4350,8 @@
             </p:nvSpPr>
             <p:spPr>
               <a:xfrm>
-                <a:off x="5976124" y="713456"/>
-                <a:ext cx="361077" cy="369332"/>
+                <a:off x="5976124" y="695605"/>
+                <a:ext cx="361077" cy="405034"/>
               </a:xfrm>
               <a:prstGeom prst="rect">
                 <a:avLst/>
@@ -4184,7 +4369,7 @@
                   <a:rPr lang="en-US" b="1" cap="none" spc="0" dirty="0" smtClean="0">
                     <a:ln w="0"/>
                     <a:solidFill>
-                      <a:schemeClr val="tx1"/>
+                      <a:schemeClr val="bg1"/>
                     </a:solidFill>
                     <a:effectLst>
                       <a:outerShdw blurRad="38100" dist="19050" dir="2700000" algn="tl" rotWithShape="0">
@@ -4199,7 +4384,7 @@
                 <a:endParaRPr lang="en-US" sz="5400" b="1" cap="none" spc="0" dirty="0">
                   <a:ln w="0"/>
                   <a:solidFill>
-                    <a:schemeClr val="tx1"/>
+                    <a:schemeClr val="bg1"/>
                   </a:solidFill>
                   <a:effectLst>
                     <a:outerShdw blurRad="38100" dist="19050" dir="2700000" algn="tl" rotWithShape="0">
@@ -4220,8 +4405,8 @@
             </p:nvSpPr>
             <p:spPr>
               <a:xfrm>
-                <a:off x="5443463" y="500392"/>
-                <a:ext cx="361077" cy="369332"/>
+                <a:off x="5443463" y="482541"/>
+                <a:ext cx="361077" cy="405034"/>
               </a:xfrm>
               <a:prstGeom prst="rect">
                 <a:avLst/>
@@ -4238,6 +4423,9 @@
                 <a:r>
                   <a:rPr lang="en-US" b="1" dirty="0">
                     <a:ln w="0"/>
+                    <a:solidFill>
+                      <a:schemeClr val="bg1"/>
+                    </a:solidFill>
                     <a:effectLst>
                       <a:outerShdw blurRad="38100" dist="19050" dir="2700000" algn="tl" rotWithShape="0">
                         <a:schemeClr val="dk1">
@@ -4251,7 +4439,7 @@
                 <a:endParaRPr lang="en-US" sz="5400" b="1" cap="none" spc="0" dirty="0">
                   <a:ln w="0"/>
                   <a:solidFill>
-                    <a:schemeClr val="tx1"/>
+                    <a:schemeClr val="bg1"/>
                   </a:solidFill>
                   <a:effectLst>
                     <a:outerShdw blurRad="38100" dist="19050" dir="2700000" algn="tl" rotWithShape="0">
@@ -4506,35 +4694,33 @@
           <a:p>
             <a:r>
               <a:rPr lang="en-US" dirty="0" smtClean="0"/>
-              <a:t>1: </a:t>
+              <a:t>1: Max </a:t>
             </a:r>
             <a:r>
               <a:rPr lang="en-US" dirty="0" smtClean="0"/>
-              <a:t>Max Angle</a:t>
+              <a:t>Angle Ceiling</a:t>
             </a:r>
             <a:endParaRPr lang="en-US" dirty="0" smtClean="0"/>
           </a:p>
           <a:p>
             <a:r>
               <a:rPr lang="en-US" dirty="0" smtClean="0"/>
-              <a:t>2: </a:t>
-            </a:r>
+              <a:t>2: Mid Ceiling</a:t>
+            </a:r>
+          </a:p>
+          <a:p>
             <a:r>
               <a:rPr lang="en-US" dirty="0" smtClean="0"/>
-              <a:t>Mid Ceiling</a:t>
-            </a:r>
-            <a:endParaRPr lang="en-US" dirty="0" smtClean="0"/>
-          </a:p>
-          <a:p>
+              <a:t>3: Min </a:t>
+            </a:r>
             <a:r>
               <a:rPr lang="en-US" dirty="0" smtClean="0"/>
-              <a:t>3: </a:t>
+              <a:t>Angle </a:t>
             </a:r>
             <a:r>
               <a:rPr lang="en-US" dirty="0" smtClean="0"/>
-              <a:t>Min Angle: Ceiling</a:t>
-            </a:r>
-            <a:endParaRPr lang="en-US" dirty="0" smtClean="0"/>
+              <a:t>Ceiling</a:t>
+            </a:r>
           </a:p>
           <a:p>
             <a:r>
@@ -4543,18 +4729,17 @@
             </a:r>
             <a:r>
               <a:rPr lang="en-US" dirty="0" smtClean="0"/>
-              <a:t>Min Angle: Wall</a:t>
-            </a:r>
-            <a:endParaRPr lang="en-US" dirty="0" smtClean="0"/>
-          </a:p>
-          <a:p>
+              <a:t>Max Angle </a:t>
+            </a:r>
             <a:r>
               <a:rPr lang="en-US" dirty="0" smtClean="0"/>
-              <a:t>5: </a:t>
-            </a:r>
+              <a:t>Wall</a:t>
+            </a:r>
+          </a:p>
+          <a:p>
             <a:r>
               <a:rPr lang="en-US" dirty="0" smtClean="0"/>
-              <a:t>Max Angle: Sill</a:t>
+              <a:t>5: Soffit </a:t>
             </a:r>
             <a:endParaRPr lang="en-US" dirty="0"/>
           </a:p>
@@ -4858,7 +5043,7 @@
               <a:rPr lang="en-US" sz="2000" b="1" cap="none" spc="0" dirty="0" smtClean="0">
                 <a:ln w="0"/>
                 <a:solidFill>
-                  <a:schemeClr val="tx1"/>
+                  <a:schemeClr val="bg1"/>
                 </a:solidFill>
                 <a:effectLst>
                   <a:outerShdw blurRad="38100" dist="19050" dir="2700000" algn="tl" rotWithShape="0">
@@ -4873,7 +5058,7 @@
             <a:endParaRPr lang="en-US" sz="5400" b="1" cap="none" spc="0" dirty="0">
               <a:ln w="0"/>
               <a:solidFill>
-                <a:schemeClr val="tx1"/>
+                <a:schemeClr val="bg1"/>
               </a:solidFill>
               <a:effectLst>
                 <a:outerShdw blurRad="38100" dist="19050" dir="2700000" algn="tl" rotWithShape="0">
@@ -4912,6 +5097,9 @@
             <a:r>
               <a:rPr lang="en-US" sz="2000" b="1" dirty="0">
                 <a:ln w="0"/>
+                <a:solidFill>
+                  <a:schemeClr val="bg1"/>
+                </a:solidFill>
                 <a:effectLst>
                   <a:outerShdw blurRad="38100" dist="19050" dir="2700000" algn="tl" rotWithShape="0">
                     <a:schemeClr val="dk1">
@@ -4925,7 +5113,7 @@
             <a:endParaRPr lang="en-US" sz="5400" b="1" cap="none" spc="0" dirty="0">
               <a:ln w="0"/>
               <a:solidFill>
-                <a:schemeClr val="tx1"/>
+                <a:schemeClr val="bg1"/>
               </a:solidFill>
               <a:effectLst>
                 <a:outerShdw blurRad="38100" dist="19050" dir="2700000" algn="tl" rotWithShape="0">
@@ -5068,54 +5256,6 @@
           <p:spPr>
             <a:xfrm rot="3774468">
               <a:off x="6700608" y="723865"/>
-              <a:ext cx="622543" cy="567756"/>
-            </a:xfrm>
-            <a:prstGeom prst="irregularSeal2">
-              <a:avLst/>
-            </a:prstGeom>
-            <a:solidFill>
-              <a:srgbClr val="112CF7"/>
-            </a:solidFill>
-            <a:ln>
-              <a:solidFill>
-                <a:srgbClr val="112CF7"/>
-              </a:solidFill>
-            </a:ln>
-          </p:spPr>
-          <p:style>
-            <a:lnRef idx="2">
-              <a:schemeClr val="accent1">
-                <a:shade val="50000"/>
-              </a:schemeClr>
-            </a:lnRef>
-            <a:fillRef idx="1">
-              <a:schemeClr val="accent1"/>
-            </a:fillRef>
-            <a:effectRef idx="0">
-              <a:schemeClr val="accent1"/>
-            </a:effectRef>
-            <a:fontRef idx="minor">
-              <a:schemeClr val="lt1"/>
-            </a:fontRef>
-          </p:style>
-          <p:txBody>
-            <a:bodyPr rtlCol="0" anchor="ctr"/>
-            <a:lstStyle/>
-            <a:p>
-              <a:pPr algn="ctr"/>
-              <a:endParaRPr lang="en-US"/>
-            </a:p>
-          </p:txBody>
-        </p:sp>
-        <p:sp>
-          <p:nvSpPr>
-            <p:cNvPr id="5" name="Explosion 2 4"/>
-            <p:cNvSpPr/>
-            <p:nvPr/>
-          </p:nvSpPr>
-          <p:spPr>
-            <a:xfrm rot="3774468">
-              <a:off x="7616486" y="466415"/>
               <a:ext cx="622543" cy="567756"/>
             </a:xfrm>
             <a:prstGeom prst="irregularSeal2">
@@ -5299,78 +5439,6 @@
             </a:fontRef>
           </p:style>
         </p:cxnSp>
-        <p:cxnSp>
-          <p:nvCxnSpPr>
-            <p:cNvPr id="15" name="Straight Connector 14"/>
-            <p:cNvCxnSpPr/>
-            <p:nvPr/>
-          </p:nvCxnSpPr>
-          <p:spPr>
-            <a:xfrm flipV="1">
-              <a:off x="5317724" y="2303755"/>
-              <a:ext cx="553658" cy="501589"/>
-            </a:xfrm>
-            <a:prstGeom prst="line">
-              <a:avLst/>
-            </a:prstGeom>
-            <a:ln w="38100">
-              <a:solidFill>
-                <a:srgbClr val="112CF7"/>
-              </a:solidFill>
-            </a:ln>
-          </p:spPr>
-          <p:style>
-            <a:lnRef idx="1">
-              <a:schemeClr val="accent1"/>
-            </a:lnRef>
-            <a:fillRef idx="0">
-              <a:schemeClr val="accent1"/>
-            </a:fillRef>
-            <a:effectRef idx="0">
-              <a:schemeClr val="accent1"/>
-            </a:effectRef>
-            <a:fontRef idx="minor">
-              <a:schemeClr val="tx1"/>
-            </a:fontRef>
-          </p:style>
-        </p:cxnSp>
-        <p:cxnSp>
-          <p:nvCxnSpPr>
-            <p:cNvPr id="17" name="Straight Arrow Connector 16"/>
-            <p:cNvCxnSpPr/>
-            <p:nvPr/>
-          </p:nvCxnSpPr>
-          <p:spPr>
-            <a:xfrm flipV="1">
-              <a:off x="5871382" y="875071"/>
-              <a:ext cx="1852191" cy="1428684"/>
-            </a:xfrm>
-            <a:prstGeom prst="straightConnector1">
-              <a:avLst/>
-            </a:prstGeom>
-            <a:ln w="38100">
-              <a:solidFill>
-                <a:srgbClr val="112CF7"/>
-              </a:solidFill>
-              <a:prstDash val="dash"/>
-              <a:tailEnd type="triangle"/>
-            </a:ln>
-          </p:spPr>
-          <p:style>
-            <a:lnRef idx="1">
-              <a:schemeClr val="accent1"/>
-            </a:lnRef>
-            <a:fillRef idx="0">
-              <a:schemeClr val="accent1"/>
-            </a:fillRef>
-            <a:effectRef idx="0">
-              <a:schemeClr val="accent1"/>
-            </a:effectRef>
-            <a:fontRef idx="minor">
-              <a:schemeClr val="tx1"/>
-            </a:fontRef>
-          </p:style>
-        </p:cxnSp>
         <p:sp>
           <p:nvSpPr>
             <p:cNvPr id="18" name="Rectangle 17"/>
@@ -5398,7 +5466,7 @@
                 <a:rPr lang="en-US" sz="2000" b="1" cap="none" spc="0" dirty="0" smtClean="0">
                   <a:ln w="0"/>
                   <a:solidFill>
-                    <a:schemeClr val="tx1"/>
+                    <a:schemeClr val="bg1"/>
                   </a:solidFill>
                   <a:effectLst>
                     <a:outerShdw blurRad="38100" dist="19050" dir="2700000" algn="tl" rotWithShape="0">
@@ -5413,7 +5481,7 @@
               <a:endParaRPr lang="en-US" sz="5400" b="1" cap="none" spc="0" dirty="0">
                 <a:ln w="0"/>
                 <a:solidFill>
-                  <a:schemeClr val="tx1"/>
+                  <a:schemeClr val="bg1"/>
                 </a:solidFill>
                 <a:effectLst>
                   <a:outerShdw blurRad="38100" dist="19050" dir="2700000" algn="tl" rotWithShape="0">
@@ -5451,6 +5519,9 @@
               <a:r>
                 <a:rPr lang="en-US" b="1" dirty="0">
                   <a:ln w="0"/>
+                  <a:solidFill>
+                    <a:schemeClr val="bg1"/>
+                  </a:solidFill>
                   <a:effectLst>
                     <a:outerShdw blurRad="38100" dist="19050" dir="2700000" algn="tl" rotWithShape="0">
                       <a:schemeClr val="dk1">
@@ -5464,61 +5535,7 @@
               <a:endParaRPr lang="en-US" sz="4800" b="1" cap="none" spc="0" dirty="0">
                 <a:ln w="0"/>
                 <a:solidFill>
-                  <a:schemeClr val="tx1"/>
-                </a:solidFill>
-                <a:effectLst>
-                  <a:outerShdw blurRad="38100" dist="19050" dir="2700000" algn="tl" rotWithShape="0">
-                    <a:schemeClr val="dk1">
-                      <a:alpha val="40000"/>
-                    </a:schemeClr>
-                  </a:outerShdw>
-                </a:effectLst>
-              </a:endParaRPr>
-            </a:p>
-          </p:txBody>
-        </p:sp>
-        <p:sp>
-          <p:nvSpPr>
-            <p:cNvPr id="20" name="Rectangle 19"/>
-            <p:cNvSpPr/>
-            <p:nvPr/>
-          </p:nvSpPr>
-          <p:spPr>
-            <a:xfrm>
-              <a:off x="7729530" y="529335"/>
-              <a:ext cx="348805" cy="400110"/>
-            </a:xfrm>
-            <a:prstGeom prst="rect">
-              <a:avLst/>
-            </a:prstGeom>
-          </p:spPr>
-          <p:txBody>
-            <a:bodyPr wrap="square">
-              <a:spAutoFit/>
-            </a:bodyPr>
-            <a:lstStyle/>
-            <a:p>
-              <a:pPr algn="ctr"/>
-              <a:r>
-                <a:rPr lang="en-US" sz="2000" b="1" cap="none" spc="0" dirty="0" smtClean="0">
-                  <a:ln w="0"/>
-                  <a:solidFill>
-                    <a:schemeClr val="tx1"/>
-                  </a:solidFill>
-                  <a:effectLst>
-                    <a:outerShdw blurRad="38100" dist="19050" dir="2700000" algn="tl" rotWithShape="0">
-                      <a:schemeClr val="dk1">
-                        <a:alpha val="40000"/>
-                      </a:schemeClr>
-                    </a:outerShdw>
-                  </a:effectLst>
-                </a:rPr>
-                <a:t>3</a:t>
-              </a:r>
-              <a:endParaRPr lang="en-US" sz="4800" b="1" cap="none" spc="0" dirty="0">
-                <a:ln w="0"/>
-                <a:solidFill>
-                  <a:schemeClr val="tx1"/>
+                  <a:schemeClr val="bg1"/>
                 </a:solidFill>
                 <a:effectLst>
                   <a:outerShdw blurRad="38100" dist="19050" dir="2700000" algn="tl" rotWithShape="0">
@@ -5541,7 +5558,7 @@
         <p:spPr>
           <a:xfrm>
             <a:off x="3885489" y="5168375"/>
-            <a:ext cx="2681057" cy="1200329"/>
+            <a:ext cx="2681057" cy="923330"/>
           </a:xfrm>
           <a:prstGeom prst="rect">
             <a:avLst/>
@@ -5556,46 +5573,25 @@
           <a:p>
             <a:r>
               <a:rPr lang="en-US" dirty="0" smtClean="0"/>
-              <a:t>1: </a:t>
+              <a:t>1: Max </a:t>
             </a:r>
             <a:r>
               <a:rPr lang="en-US" dirty="0" smtClean="0"/>
-              <a:t>Max Angle</a:t>
+              <a:t>Angle Ceiling</a:t>
             </a:r>
             <a:endParaRPr lang="en-US" dirty="0" smtClean="0"/>
           </a:p>
           <a:p>
             <a:r>
               <a:rPr lang="en-US" dirty="0" smtClean="0"/>
-              <a:t>2: </a:t>
-            </a:r>
+              <a:t>2: Mid Ceiling</a:t>
+            </a:r>
+          </a:p>
+          <a:p>
             <a:r>
               <a:rPr lang="en-US" dirty="0" smtClean="0"/>
-              <a:t>Mid Ceiling</a:t>
-            </a:r>
-            <a:endParaRPr lang="en-US" dirty="0" smtClean="0"/>
-          </a:p>
-          <a:p>
-            <a:r>
-              <a:rPr lang="en-US" dirty="0" smtClean="0"/>
-              <a:t>3: </a:t>
-            </a:r>
-            <a:r>
-              <a:rPr lang="en-US" dirty="0" smtClean="0"/>
-              <a:t>Min Angle: Ceiling</a:t>
-            </a:r>
-            <a:endParaRPr lang="en-US" dirty="0" smtClean="0"/>
-          </a:p>
-          <a:p>
-            <a:r>
-              <a:rPr lang="en-US" dirty="0" smtClean="0"/>
-              <a:t>4: </a:t>
-            </a:r>
-            <a:r>
-              <a:rPr lang="en-US" dirty="0" smtClean="0"/>
-              <a:t>At Wall</a:t>
-            </a:r>
-            <a:endParaRPr lang="en-US" dirty="0"/>
+              <a:t>3: At Wall</a:t>
+            </a:r>
           </a:p>
         </p:txBody>
       </p:sp>
@@ -5796,8 +5792,8 @@
         </p:nvSpPr>
         <p:spPr>
           <a:xfrm>
-            <a:off x="10868811" y="2193108"/>
-            <a:ext cx="314509" cy="400110"/>
+            <a:off x="10868810" y="2193108"/>
+            <a:ext cx="314510" cy="400110"/>
           </a:xfrm>
           <a:prstGeom prst="rect">
             <a:avLst/>
@@ -5812,10 +5808,10 @@
           <a:p>
             <a:pPr algn="ctr"/>
             <a:r>
-              <a:rPr lang="en-US" sz="2000" b="1" cap="none" spc="0" dirty="0" smtClean="0">
+              <a:rPr lang="en-US" sz="2000" b="1" dirty="0">
                 <a:ln w="0"/>
                 <a:solidFill>
-                  <a:schemeClr val="tx1"/>
+                  <a:schemeClr val="bg1"/>
                 </a:solidFill>
                 <a:effectLst>
                   <a:outerShdw blurRad="38100" dist="19050" dir="2700000" algn="tl" rotWithShape="0">
@@ -5825,12 +5821,12 @@
                   </a:outerShdw>
                 </a:effectLst>
               </a:rPr>
-              <a:t>4</a:t>
+              <a:t>3</a:t>
             </a:r>
             <a:endParaRPr lang="en-US" sz="5400" b="1" cap="none" spc="0" dirty="0">
               <a:ln w="0"/>
               <a:solidFill>
-                <a:schemeClr val="tx1"/>
+                <a:schemeClr val="bg1"/>
               </a:solidFill>
               <a:effectLst>
                 <a:outerShdw blurRad="38100" dist="19050" dir="2700000" algn="tl" rotWithShape="0">

</xml_diff>